<commit_message>
Removed VisusKernel direct dependency to libressl (which is still a curl dep)
</commit_message>
<xml_diff>
--- a/docs/Presentation1.pptx
+++ b/docs/Presentation1.pptx
@@ -260,7 +260,7 @@
           <a:p>
             <a:fld id="{46A674F9-91C9-4609-A673-52F9CAD1CE1A}" type="datetimeFigureOut">
               <a:rPr lang="en-US" smtClean="0"/>
-              <a:t>01-Feb-19</a:t>
+              <a:t>30-May-19</a:t>
             </a:fld>
             <a:endParaRPr lang="en-US"/>
           </a:p>
@@ -458,7 +458,7 @@
           <a:p>
             <a:fld id="{46A674F9-91C9-4609-A673-52F9CAD1CE1A}" type="datetimeFigureOut">
               <a:rPr lang="en-US" smtClean="0"/>
-              <a:t>01-Feb-19</a:t>
+              <a:t>30-May-19</a:t>
             </a:fld>
             <a:endParaRPr lang="en-US"/>
           </a:p>
@@ -666,7 +666,7 @@
           <a:p>
             <a:fld id="{46A674F9-91C9-4609-A673-52F9CAD1CE1A}" type="datetimeFigureOut">
               <a:rPr lang="en-US" smtClean="0"/>
-              <a:t>01-Feb-19</a:t>
+              <a:t>30-May-19</a:t>
             </a:fld>
             <a:endParaRPr lang="en-US"/>
           </a:p>
@@ -864,7 +864,7 @@
           <a:p>
             <a:fld id="{46A674F9-91C9-4609-A673-52F9CAD1CE1A}" type="datetimeFigureOut">
               <a:rPr lang="en-US" smtClean="0"/>
-              <a:t>01-Feb-19</a:t>
+              <a:t>30-May-19</a:t>
             </a:fld>
             <a:endParaRPr lang="en-US"/>
           </a:p>
@@ -1139,7 +1139,7 @@
           <a:p>
             <a:fld id="{46A674F9-91C9-4609-A673-52F9CAD1CE1A}" type="datetimeFigureOut">
               <a:rPr lang="en-US" smtClean="0"/>
-              <a:t>01-Feb-19</a:t>
+              <a:t>30-May-19</a:t>
             </a:fld>
             <a:endParaRPr lang="en-US"/>
           </a:p>
@@ -1404,7 +1404,7 @@
           <a:p>
             <a:fld id="{46A674F9-91C9-4609-A673-52F9CAD1CE1A}" type="datetimeFigureOut">
               <a:rPr lang="en-US" smtClean="0"/>
-              <a:t>01-Feb-19</a:t>
+              <a:t>30-May-19</a:t>
             </a:fld>
             <a:endParaRPr lang="en-US"/>
           </a:p>
@@ -1816,7 +1816,7 @@
           <a:p>
             <a:fld id="{46A674F9-91C9-4609-A673-52F9CAD1CE1A}" type="datetimeFigureOut">
               <a:rPr lang="en-US" smtClean="0"/>
-              <a:t>01-Feb-19</a:t>
+              <a:t>30-May-19</a:t>
             </a:fld>
             <a:endParaRPr lang="en-US"/>
           </a:p>
@@ -1957,7 +1957,7 @@
           <a:p>
             <a:fld id="{46A674F9-91C9-4609-A673-52F9CAD1CE1A}" type="datetimeFigureOut">
               <a:rPr lang="en-US" smtClean="0"/>
-              <a:t>01-Feb-19</a:t>
+              <a:t>30-May-19</a:t>
             </a:fld>
             <a:endParaRPr lang="en-US"/>
           </a:p>
@@ -2070,7 +2070,7 @@
           <a:p>
             <a:fld id="{46A674F9-91C9-4609-A673-52F9CAD1CE1A}" type="datetimeFigureOut">
               <a:rPr lang="en-US" smtClean="0"/>
-              <a:t>01-Feb-19</a:t>
+              <a:t>30-May-19</a:t>
             </a:fld>
             <a:endParaRPr lang="en-US"/>
           </a:p>
@@ -2381,7 +2381,7 @@
           <a:p>
             <a:fld id="{46A674F9-91C9-4609-A673-52F9CAD1CE1A}" type="datetimeFigureOut">
               <a:rPr lang="en-US" smtClean="0"/>
-              <a:t>01-Feb-19</a:t>
+              <a:t>30-May-19</a:t>
             </a:fld>
             <a:endParaRPr lang="en-US"/>
           </a:p>
@@ -2669,7 +2669,7 @@
           <a:p>
             <a:fld id="{46A674F9-91C9-4609-A673-52F9CAD1CE1A}" type="datetimeFigureOut">
               <a:rPr lang="en-US" smtClean="0"/>
-              <a:t>01-Feb-19</a:t>
+              <a:t>30-May-19</a:t>
             </a:fld>
             <a:endParaRPr lang="en-US"/>
           </a:p>
@@ -2910,7 +2910,7 @@
           <a:p>
             <a:fld id="{46A674F9-91C9-4609-A673-52F9CAD1CE1A}" type="datetimeFigureOut">
               <a:rPr lang="en-US" smtClean="0"/>
-              <a:t>01-Feb-19</a:t>
+              <a:t>30-May-19</a:t>
             </a:fld>
             <a:endParaRPr lang="en-US"/>
           </a:p>
@@ -3402,7 +3402,7 @@
         </p:nvSpPr>
         <p:spPr>
           <a:xfrm>
-            <a:off x="5606166" y="123672"/>
+            <a:off x="5606144" y="139977"/>
             <a:ext cx="6105260" cy="6245130"/>
           </a:xfrm>
           <a:custGeom>
@@ -3574,7 +3574,7 @@
         <p:spPr>
           <a:xfrm>
             <a:off x="4034233" y="62617"/>
-            <a:ext cx="5762907" cy="3227867"/>
+            <a:ext cx="5762907" cy="3468590"/>
           </a:xfrm>
           <a:custGeom>
             <a:avLst/>
@@ -4280,174 +4280,6 @@
       </p:sp>
       <p:sp>
         <p:nvSpPr>
-          <p:cNvPr id="313" name="Freeform: Shape 312">
-            <a:extLst>
-              <a:ext uri="{FF2B5EF4-FFF2-40B4-BE49-F238E27FC236}">
-                <a16:creationId xmlns:a16="http://schemas.microsoft.com/office/drawing/2014/main" id="{96099DDB-1D78-42A7-A85A-7F9D0C9A4F1F}"/>
-              </a:ext>
-            </a:extLst>
-          </p:cNvPr>
-          <p:cNvSpPr/>
-          <p:nvPr/>
-        </p:nvSpPr>
-        <p:spPr>
-          <a:xfrm>
-            <a:off x="5068066" y="5583083"/>
-            <a:ext cx="2079398" cy="1148333"/>
-          </a:xfrm>
-          <a:custGeom>
-            <a:avLst/>
-            <a:gdLst>
-              <a:gd name="connsiteX0" fmla="*/ 398136 w 2101360"/>
-              <a:gd name="connsiteY0" fmla="*/ 169789 h 1358575"/>
-              <a:gd name="connsiteX1" fmla="*/ 828959 w 2101360"/>
-              <a:gd name="connsiteY1" fmla="*/ 2735 h 1358575"/>
-              <a:gd name="connsiteX2" fmla="*/ 1848867 w 2101360"/>
-              <a:gd name="connsiteY2" fmla="*/ 310466 h 1358575"/>
-              <a:gd name="connsiteX3" fmla="*/ 2033505 w 2101360"/>
-              <a:gd name="connsiteY3" fmla="*/ 1207281 h 1358575"/>
-              <a:gd name="connsiteX4" fmla="*/ 899297 w 2101360"/>
-              <a:gd name="connsiteY4" fmla="*/ 1356750 h 1358575"/>
-              <a:gd name="connsiteX5" fmla="*/ 20067 w 2101360"/>
-              <a:gd name="connsiteY5" fmla="*/ 1198489 h 1358575"/>
-              <a:gd name="connsiteX6" fmla="*/ 292628 w 2101360"/>
-              <a:gd name="connsiteY6" fmla="*/ 345635 h 1358575"/>
-              <a:gd name="connsiteX7" fmla="*/ 398136 w 2101360"/>
-              <a:gd name="connsiteY7" fmla="*/ 169789 h 1358575"/>
-              <a:gd name="connsiteX0" fmla="*/ 296841 w 2105573"/>
-              <a:gd name="connsiteY0" fmla="*/ 343118 h 1356058"/>
-              <a:gd name="connsiteX1" fmla="*/ 833172 w 2105573"/>
-              <a:gd name="connsiteY1" fmla="*/ 218 h 1356058"/>
-              <a:gd name="connsiteX2" fmla="*/ 1853080 w 2105573"/>
-              <a:gd name="connsiteY2" fmla="*/ 307949 h 1356058"/>
-              <a:gd name="connsiteX3" fmla="*/ 2037718 w 2105573"/>
-              <a:gd name="connsiteY3" fmla="*/ 1204764 h 1356058"/>
-              <a:gd name="connsiteX4" fmla="*/ 903510 w 2105573"/>
-              <a:gd name="connsiteY4" fmla="*/ 1354233 h 1356058"/>
-              <a:gd name="connsiteX5" fmla="*/ 24280 w 2105573"/>
-              <a:gd name="connsiteY5" fmla="*/ 1195972 h 1356058"/>
-              <a:gd name="connsiteX6" fmla="*/ 296841 w 2105573"/>
-              <a:gd name="connsiteY6" fmla="*/ 343118 h 1356058"/>
-              <a:gd name="connsiteX0" fmla="*/ 296841 w 2105573"/>
-              <a:gd name="connsiteY0" fmla="*/ 343118 h 1366647"/>
-              <a:gd name="connsiteX1" fmla="*/ 833172 w 2105573"/>
-              <a:gd name="connsiteY1" fmla="*/ 218 h 1366647"/>
-              <a:gd name="connsiteX2" fmla="*/ 1853080 w 2105573"/>
-              <a:gd name="connsiteY2" fmla="*/ 307949 h 1366647"/>
-              <a:gd name="connsiteX3" fmla="*/ 2037718 w 2105573"/>
-              <a:gd name="connsiteY3" fmla="*/ 1204764 h 1366647"/>
-              <a:gd name="connsiteX4" fmla="*/ 903510 w 2105573"/>
-              <a:gd name="connsiteY4" fmla="*/ 1354233 h 1366647"/>
-              <a:gd name="connsiteX5" fmla="*/ 24280 w 2105573"/>
-              <a:gd name="connsiteY5" fmla="*/ 1195972 h 1366647"/>
-              <a:gd name="connsiteX6" fmla="*/ 296841 w 2105573"/>
-              <a:gd name="connsiteY6" fmla="*/ 343118 h 1366647"/>
-              <a:gd name="connsiteX0" fmla="*/ 371388 w 2244938"/>
-              <a:gd name="connsiteY0" fmla="*/ 343118 h 1309877"/>
-              <a:gd name="connsiteX1" fmla="*/ 907719 w 2244938"/>
-              <a:gd name="connsiteY1" fmla="*/ 218 h 1309877"/>
-              <a:gd name="connsiteX2" fmla="*/ 1927627 w 2244938"/>
-              <a:gd name="connsiteY2" fmla="*/ 307949 h 1309877"/>
-              <a:gd name="connsiteX3" fmla="*/ 2112265 w 2244938"/>
-              <a:gd name="connsiteY3" fmla="*/ 1204764 h 1309877"/>
-              <a:gd name="connsiteX4" fmla="*/ 98827 w 2244938"/>
-              <a:gd name="connsiteY4" fmla="*/ 1195972 h 1309877"/>
-              <a:gd name="connsiteX5" fmla="*/ 371388 w 2244938"/>
-              <a:gd name="connsiteY5" fmla="*/ 343118 h 1309877"/>
-            </a:gdLst>
-            <a:ahLst/>
-            <a:cxnLst>
-              <a:cxn ang="0">
-                <a:pos x="connsiteX0" y="connsiteY0"/>
-              </a:cxn>
-              <a:cxn ang="0">
-                <a:pos x="connsiteX1" y="connsiteY1"/>
-              </a:cxn>
-              <a:cxn ang="0">
-                <a:pos x="connsiteX2" y="connsiteY2"/>
-              </a:cxn>
-              <a:cxn ang="0">
-                <a:pos x="connsiteX3" y="connsiteY3"/>
-              </a:cxn>
-              <a:cxn ang="0">
-                <a:pos x="connsiteX4" y="connsiteY4"/>
-              </a:cxn>
-              <a:cxn ang="0">
-                <a:pos x="connsiteX5" y="connsiteY5"/>
-              </a:cxn>
-            </a:cxnLst>
-            <a:rect l="l" t="t" r="r" b="b"/>
-            <a:pathLst>
-              <a:path w="2244938" h="1309877">
-                <a:moveTo>
-                  <a:pt x="371388" y="343118"/>
-                </a:moveTo>
-                <a:cubicBezTo>
-                  <a:pt x="506203" y="143826"/>
-                  <a:pt x="648346" y="6079"/>
-                  <a:pt x="907719" y="218"/>
-                </a:cubicBezTo>
-                <a:cubicBezTo>
-                  <a:pt x="1167092" y="-5643"/>
-                  <a:pt x="1726869" y="107191"/>
-                  <a:pt x="1927627" y="307949"/>
-                </a:cubicBezTo>
-                <a:cubicBezTo>
-                  <a:pt x="2128385" y="508707"/>
-                  <a:pt x="2417065" y="1056760"/>
-                  <a:pt x="2112265" y="1204764"/>
-                </a:cubicBezTo>
-                <a:cubicBezTo>
-                  <a:pt x="1807465" y="1352768"/>
-                  <a:pt x="388973" y="1339580"/>
-                  <a:pt x="98827" y="1195972"/>
-                </a:cubicBezTo>
-                <a:cubicBezTo>
-                  <a:pt x="-191319" y="1052364"/>
-                  <a:pt x="236573" y="542410"/>
-                  <a:pt x="371388" y="343118"/>
-                </a:cubicBezTo>
-                <a:close/>
-              </a:path>
-            </a:pathLst>
-          </a:custGeom>
-          <a:solidFill>
-            <a:schemeClr val="accent6">
-              <a:lumMod val="20000"/>
-              <a:lumOff val="80000"/>
-            </a:schemeClr>
-          </a:solidFill>
-          <a:ln>
-            <a:noFill/>
-          </a:ln>
-        </p:spPr>
-        <p:style>
-          <a:lnRef idx="2">
-            <a:schemeClr val="accent1">
-              <a:shade val="50000"/>
-            </a:schemeClr>
-          </a:lnRef>
-          <a:fillRef idx="1">
-            <a:schemeClr val="accent1"/>
-          </a:fillRef>
-          <a:effectRef idx="0">
-            <a:schemeClr val="accent1"/>
-          </a:effectRef>
-          <a:fontRef idx="minor">
-            <a:schemeClr val="lt1"/>
-          </a:fontRef>
-        </p:style>
-        <p:txBody>
-          <a:bodyPr rtlCol="0" anchor="ctr"/>
-          <a:lstStyle/>
-          <a:p>
-            <a:pPr algn="ctr"/>
-            <a:endParaRPr lang="en-US"/>
-          </a:p>
-        </p:txBody>
-      </p:sp>
-      <p:sp>
-        <p:nvSpPr>
           <p:cNvPr id="312" name="Freeform: Shape 311">
             <a:extLst>
               <a:ext uri="{FF2B5EF4-FFF2-40B4-BE49-F238E27FC236}">
@@ -5225,7 +5057,7 @@
                   <a:schemeClr val="bg1"/>
                 </a:solidFill>
               </a:rPr>
-              <a:t>TTmath</a:t>
+              <a:t>cryptlite</a:t>
             </a:r>
             <a:endParaRPr lang="en-US" sz="1000" b="1" dirty="0">
               <a:solidFill>
@@ -6159,8 +5991,8 @@
         </p:nvGrpSpPr>
         <p:grpSpPr>
           <a:xfrm>
-            <a:off x="3261291" y="2814619"/>
-            <a:ext cx="1207917" cy="504652"/>
+            <a:off x="3338340" y="3236220"/>
+            <a:ext cx="1207917" cy="629306"/>
             <a:chOff x="3146207" y="2722224"/>
             <a:chExt cx="861487" cy="235420"/>
           </a:xfrm>
@@ -6261,7 +6093,7 @@
         </p:nvGrpSpPr>
         <p:grpSpPr>
           <a:xfrm>
-            <a:off x="1393384" y="4261528"/>
+            <a:off x="759647" y="3257598"/>
             <a:ext cx="1186775" cy="622036"/>
             <a:chOff x="933056" y="2117890"/>
             <a:chExt cx="863034" cy="351921"/>
@@ -6486,7 +6318,7 @@
         </p:nvGrpSpPr>
         <p:grpSpPr>
           <a:xfrm>
-            <a:off x="9340484" y="2477828"/>
+            <a:off x="9357341" y="3199739"/>
             <a:ext cx="1371538" cy="557638"/>
             <a:chOff x="9557203" y="2576969"/>
             <a:chExt cx="855679" cy="340665"/>
@@ -7439,14 +7271,15 @@
           </p:cNvPr>
           <p:cNvCxnSpPr>
             <a:cxnSpLocks/>
+            <a:stCxn id="13" idx="0"/>
             <a:endCxn id="36" idx="2"/>
           </p:cNvCxnSpPr>
           <p:nvPr/>
         </p:nvCxnSpPr>
         <p:spPr>
           <a:xfrm flipV="1">
-            <a:off x="6096000" y="4603025"/>
-            <a:ext cx="8356" cy="980058"/>
+            <a:off x="5710437" y="4603025"/>
+            <a:ext cx="393919" cy="1678337"/>
           </a:xfrm>
           <a:prstGeom prst="straightConnector1">
             <a:avLst/>
@@ -7587,8 +7420,8 @@
         </p:nvCxnSpPr>
         <p:spPr>
           <a:xfrm flipH="1" flipV="1">
-            <a:off x="10259288" y="3059003"/>
-            <a:ext cx="845552" cy="2524080"/>
+            <a:off x="10260441" y="3801923"/>
+            <a:ext cx="844399" cy="1781160"/>
           </a:xfrm>
           <a:prstGeom prst="straightConnector1">
             <a:avLst/>
@@ -7630,14 +7463,14 @@
           <p:cNvCxnSpPr>
             <a:cxnSpLocks/>
             <a:stCxn id="36" idx="1"/>
-            <a:endCxn id="43" idx="3"/>
+            <a:endCxn id="42" idx="2"/>
           </p:cNvCxnSpPr>
           <p:nvPr/>
         </p:nvCxnSpPr>
         <p:spPr>
-          <a:xfrm flipH="1">
-            <a:off x="2570042" y="4260254"/>
-            <a:ext cx="2671352" cy="293727"/>
+          <a:xfrm flipH="1" flipV="1">
+            <a:off x="1358092" y="3879634"/>
+            <a:ext cx="3883302" cy="380620"/>
           </a:xfrm>
           <a:prstGeom prst="straightConnector1">
             <a:avLst/>
@@ -7684,8 +7517,8 @@
         </p:nvCxnSpPr>
         <p:spPr>
           <a:xfrm flipH="1" flipV="1">
-            <a:off x="4461064" y="3079507"/>
-            <a:ext cx="969261" cy="815971"/>
+            <a:off x="4538113" y="3566538"/>
+            <a:ext cx="726593" cy="400025"/>
           </a:xfrm>
           <a:prstGeom prst="straightConnector1">
             <a:avLst/>
@@ -7731,8 +7564,8 @@
         </p:nvCxnSpPr>
         <p:spPr>
           <a:xfrm flipH="1" flipV="1">
-            <a:off x="2805491" y="2400450"/>
-            <a:ext cx="585788" cy="397579"/>
+            <a:off x="2805491" y="2400451"/>
+            <a:ext cx="713907" cy="812489"/>
           </a:xfrm>
           <a:prstGeom prst="straightConnector1">
             <a:avLst/>
@@ -7826,7 +7659,7 @@
         </p:nvCxnSpPr>
         <p:spPr>
           <a:xfrm flipV="1">
-            <a:off x="6967288" y="2766634"/>
+            <a:off x="6984145" y="3488545"/>
             <a:ext cx="2387085" cy="1223110"/>
           </a:xfrm>
           <a:prstGeom prst="straightConnector1">
@@ -8255,8 +8088,8 @@
         </p:nvCxnSpPr>
         <p:spPr>
           <a:xfrm flipH="1" flipV="1">
-            <a:off x="8961044" y="1797215"/>
-            <a:ext cx="524187" cy="641056"/>
+            <a:off x="8961045" y="1797215"/>
+            <a:ext cx="514833" cy="1368042"/>
           </a:xfrm>
           <a:prstGeom prst="straightConnector1">
             <a:avLst/>
@@ -8468,7 +8301,7 @@
         </p:nvSpPr>
         <p:spPr>
           <a:xfrm>
-            <a:off x="9218061" y="3613733"/>
+            <a:off x="9357341" y="4029168"/>
             <a:ext cx="1304732" cy="461665"/>
           </a:xfrm>
           <a:prstGeom prst="rect">
@@ -8505,61 +8338,6 @@
                 </a:solidFill>
               </a:rPr>
               <a:t>VISUS_GUI</a:t>
-            </a:r>
-          </a:p>
-        </p:txBody>
-      </p:sp>
-      <p:sp>
-        <p:nvSpPr>
-          <p:cNvPr id="307" name="TextBox 306">
-            <a:extLst>
-              <a:ext uri="{FF2B5EF4-FFF2-40B4-BE49-F238E27FC236}">
-                <a16:creationId xmlns:a16="http://schemas.microsoft.com/office/drawing/2014/main" id="{C1D2D771-8328-4F9F-A250-9EAD6EED7D75}"/>
-              </a:ext>
-            </a:extLst>
-          </p:cNvPr>
-          <p:cNvSpPr txBox="1"/>
-          <p:nvPr/>
-        </p:nvSpPr>
-        <p:spPr>
-          <a:xfrm>
-            <a:off x="5164102" y="5728472"/>
-            <a:ext cx="1901218" cy="461665"/>
-          </a:xfrm>
-          <a:prstGeom prst="rect">
-            <a:avLst/>
-          </a:prstGeom>
-          <a:noFill/>
-        </p:spPr>
-        <p:txBody>
-          <a:bodyPr wrap="square" rtlCol="0">
-            <a:spAutoFit/>
-          </a:bodyPr>
-          <a:lstStyle/>
-          <a:p>
-            <a:pPr algn="ctr"/>
-            <a:r>
-              <a:rPr lang="en-US" sz="1200" b="1" dirty="0">
-                <a:solidFill>
-                  <a:schemeClr val="bg1">
-                    <a:lumMod val="50000"/>
-                  </a:schemeClr>
-                </a:solidFill>
-              </a:rPr>
-              <a:t>option</a:t>
-            </a:r>
-          </a:p>
-          <a:p>
-            <a:pPr algn="ctr"/>
-            <a:r>
-              <a:rPr lang="en-US" sz="1200" b="1" u="sng" dirty="0">
-                <a:solidFill>
-                  <a:schemeClr val="accent4">
-                    <a:lumMod val="75000"/>
-                  </a:schemeClr>
-                </a:solidFill>
-              </a:rPr>
-              <a:t>VISUS_COMPRESSION</a:t>
             </a:r>
           </a:p>
         </p:txBody>
@@ -8626,7 +8404,7 @@
         </p:nvSpPr>
         <p:spPr>
           <a:xfrm>
-            <a:off x="1532717" y="3991104"/>
+            <a:off x="898980" y="2987174"/>
             <a:ext cx="941556" cy="246221"/>
           </a:xfrm>
           <a:prstGeom prst="rect">
@@ -8675,7 +8453,7 @@
         </p:nvSpPr>
         <p:spPr>
           <a:xfrm>
-            <a:off x="3513302" y="2539614"/>
+            <a:off x="3590351" y="2961215"/>
             <a:ext cx="755335" cy="246221"/>
           </a:xfrm>
           <a:prstGeom prst="rect">
@@ -8773,7 +8551,7 @@
         </p:nvSpPr>
         <p:spPr>
           <a:xfrm>
-            <a:off x="9593118" y="2199913"/>
+            <a:off x="9609975" y="2921824"/>
             <a:ext cx="828987" cy="246221"/>
           </a:xfrm>
           <a:prstGeom prst="rect">
@@ -9018,7 +8796,7 @@
         </p:nvGrpSpPr>
         <p:grpSpPr>
           <a:xfrm>
-            <a:off x="1374441" y="3136030"/>
+            <a:off x="2077467" y="3258332"/>
             <a:ext cx="1176660" cy="622036"/>
             <a:chOff x="940412" y="2117890"/>
             <a:chExt cx="855678" cy="351921"/>
@@ -9127,7 +8905,7 @@
         </p:nvSpPr>
         <p:spPr>
           <a:xfrm>
-            <a:off x="1523723" y="2846962"/>
+            <a:off x="2226749" y="2969264"/>
             <a:ext cx="941556" cy="246221"/>
           </a:xfrm>
           <a:prstGeom prst="rect">
@@ -9173,14 +8951,13 @@
           </p:cNvPr>
           <p:cNvCxnSpPr>
             <a:cxnSpLocks/>
-            <a:endCxn id="112" idx="3"/>
           </p:cNvCxnSpPr>
           <p:nvPr/>
         </p:nvCxnSpPr>
         <p:spPr>
           <a:xfrm flipH="1" flipV="1">
-            <a:off x="2551100" y="3400292"/>
-            <a:ext cx="2727686" cy="698200"/>
+            <a:off x="2805492" y="3894848"/>
+            <a:ext cx="2435902" cy="220369"/>
           </a:xfrm>
           <a:prstGeom prst="straightConnector1">
             <a:avLst/>
@@ -9224,8 +9001,8 @@
         </p:nvSpPr>
         <p:spPr>
           <a:xfrm rot="16200000">
-            <a:off x="-1572257" y="2175910"/>
-            <a:ext cx="4259570" cy="1015663"/>
+            <a:off x="-1504913" y="1222015"/>
+            <a:ext cx="3599187" cy="1015663"/>
           </a:xfrm>
           <a:prstGeom prst="rect">
             <a:avLst/>
@@ -9251,6 +9028,53 @@
           </a:p>
         </p:txBody>
       </p:sp>
+      <p:cxnSp>
+        <p:nvCxnSpPr>
+          <p:cNvPr id="117" name="Straight Arrow Connector 116">
+            <a:extLst>
+              <a:ext uri="{FF2B5EF4-FFF2-40B4-BE49-F238E27FC236}">
+                <a16:creationId xmlns:a16="http://schemas.microsoft.com/office/drawing/2014/main" id="{EB8A7510-AD68-4824-954A-990656F4A721}"/>
+              </a:ext>
+            </a:extLst>
+          </p:cNvPr>
+          <p:cNvCxnSpPr>
+            <a:cxnSpLocks/>
+          </p:cNvCxnSpPr>
+          <p:nvPr/>
+        </p:nvCxnSpPr>
+        <p:spPr>
+          <a:xfrm flipH="1" flipV="1">
+            <a:off x="6309711" y="4642583"/>
+            <a:ext cx="372896" cy="1620600"/>
+          </a:xfrm>
+          <a:prstGeom prst="straightConnector1">
+            <a:avLst/>
+          </a:prstGeom>
+          <a:ln w="38100">
+            <a:solidFill>
+              <a:schemeClr val="accent2">
+                <a:lumMod val="50000"/>
+              </a:schemeClr>
+            </a:solidFill>
+            <a:prstDash val="sysDot"/>
+            <a:tailEnd type="triangle"/>
+          </a:ln>
+        </p:spPr>
+        <p:style>
+          <a:lnRef idx="1">
+            <a:schemeClr val="accent1"/>
+          </a:lnRef>
+          <a:fillRef idx="0">
+            <a:schemeClr val="accent1"/>
+          </a:fillRef>
+          <a:effectRef idx="0">
+            <a:schemeClr val="accent1"/>
+          </a:effectRef>
+          <a:fontRef idx="minor">
+            <a:schemeClr val="tx1"/>
+          </a:fontRef>
+        </p:style>
+      </p:cxnSp>
     </p:spTree>
     <p:extLst>
       <p:ext uri="{BB962C8B-B14F-4D97-AF65-F5344CB8AC3E}">

</xml_diff>